<commit_message>
Finish machine learning hw2
</commit_message>
<xml_diff>
--- a/ex02/实验二.pptx
+++ b/ex02/实验二.pptx
@@ -206,7 +206,7 @@
           <a:p>
             <a:fld id="{94B7B94C-78E5-4F37-BAAC-99128119110D}" type="datetimeFigureOut">
               <a:rPr lang="zh-CN" altLang="en-US" smtClean="0"/>
-              <a:t>2022/05/09</a:t>
+              <a:t>2022/05/15</a:t>
             </a:fld>
             <a:endParaRPr lang="zh-CN" altLang="en-US"/>
           </a:p>
@@ -604,7 +604,7 @@
           <a:p>
             <a:fld id="{422C5752-E62A-447A-B768-1F0DD14E96AD}" type="datetimeFigureOut">
               <a:rPr lang="zh-CN" altLang="en-US" smtClean="0"/>
-              <a:t>2022/05/09</a:t>
+              <a:t>2022/05/15</a:t>
             </a:fld>
             <a:endParaRPr lang="zh-CN" altLang="en-US"/>
           </a:p>
@@ -863,7 +863,7 @@
           <a:p>
             <a:fld id="{422C5752-E62A-447A-B768-1F0DD14E96AD}" type="datetimeFigureOut">
               <a:rPr lang="zh-CN" altLang="en-US" smtClean="0"/>
-              <a:t>2022/05/09</a:t>
+              <a:t>2022/05/15</a:t>
             </a:fld>
             <a:endParaRPr lang="zh-CN" altLang="en-US"/>
           </a:p>
@@ -1043,7 +1043,7 @@
           <a:p>
             <a:fld id="{422C5752-E62A-447A-B768-1F0DD14E96AD}" type="datetimeFigureOut">
               <a:rPr lang="zh-CN" altLang="en-US" smtClean="0"/>
-              <a:t>2022/05/09</a:t>
+              <a:t>2022/05/15</a:t>
             </a:fld>
             <a:endParaRPr lang="zh-CN" altLang="en-US"/>
           </a:p>
@@ -1213,7 +1213,7 @@
           <a:p>
             <a:fld id="{422C5752-E62A-447A-B768-1F0DD14E96AD}" type="datetimeFigureOut">
               <a:rPr lang="zh-CN" altLang="en-US" smtClean="0"/>
-              <a:t>2022/05/09</a:t>
+              <a:t>2022/05/15</a:t>
             </a:fld>
             <a:endParaRPr lang="zh-CN" altLang="en-US"/>
           </a:p>
@@ -1457,7 +1457,7 @@
           <a:p>
             <a:fld id="{422C5752-E62A-447A-B768-1F0DD14E96AD}" type="datetimeFigureOut">
               <a:rPr lang="zh-CN" altLang="en-US" smtClean="0"/>
-              <a:t>2022/05/09</a:t>
+              <a:t>2022/05/15</a:t>
             </a:fld>
             <a:endParaRPr lang="zh-CN" altLang="en-US"/>
           </a:p>
@@ -1689,7 +1689,7 @@
           <a:p>
             <a:fld id="{422C5752-E62A-447A-B768-1F0DD14E96AD}" type="datetimeFigureOut">
               <a:rPr lang="zh-CN" altLang="en-US" smtClean="0"/>
-              <a:t>2022/05/09</a:t>
+              <a:t>2022/05/15</a:t>
             </a:fld>
             <a:endParaRPr lang="zh-CN" altLang="en-US"/>
           </a:p>
@@ -2056,7 +2056,7 @@
           <a:p>
             <a:fld id="{422C5752-E62A-447A-B768-1F0DD14E96AD}" type="datetimeFigureOut">
               <a:rPr lang="zh-CN" altLang="en-US" smtClean="0"/>
-              <a:t>2022/05/09</a:t>
+              <a:t>2022/05/15</a:t>
             </a:fld>
             <a:endParaRPr lang="zh-CN" altLang="en-US"/>
           </a:p>
@@ -2174,7 +2174,7 @@
           <a:p>
             <a:fld id="{422C5752-E62A-447A-B768-1F0DD14E96AD}" type="datetimeFigureOut">
               <a:rPr lang="zh-CN" altLang="en-US" smtClean="0"/>
-              <a:t>2022/05/09</a:t>
+              <a:t>2022/05/15</a:t>
             </a:fld>
             <a:endParaRPr lang="zh-CN" altLang="en-US"/>
           </a:p>
@@ -2269,7 +2269,7 @@
           <a:p>
             <a:fld id="{C764DE79-268F-4C1A-8933-263129D2AF90}" type="datetimeFigureOut">
               <a:rPr lang="en-US" dirty="0"/>
-              <a:t>5/9/2022</a:t>
+              <a:t>5/15/2022</a:t>
             </a:fld>
             <a:endParaRPr lang="en-US" dirty="0"/>
           </a:p>
@@ -2795,7 +2795,7 @@
           <a:p>
             <a:fld id="{422C5752-E62A-447A-B768-1F0DD14E96AD}" type="datetimeFigureOut">
               <a:rPr lang="zh-CN" altLang="en-US" smtClean="0"/>
-              <a:t>2022/05/09</a:t>
+              <a:t>2022/05/15</a:t>
             </a:fld>
             <a:endParaRPr lang="zh-CN" altLang="en-US"/>
           </a:p>
@@ -3052,7 +3052,7 @@
           <a:p>
             <a:fld id="{422C5752-E62A-447A-B768-1F0DD14E96AD}" type="datetimeFigureOut">
               <a:rPr lang="zh-CN" altLang="en-US" smtClean="0"/>
-              <a:t>2022/05/09</a:t>
+              <a:t>2022/05/15</a:t>
             </a:fld>
             <a:endParaRPr lang="zh-CN" altLang="en-US"/>
           </a:p>
@@ -3265,7 +3265,7 @@
           <a:p>
             <a:fld id="{422C5752-E62A-447A-B768-1F0DD14E96AD}" type="datetimeFigureOut">
               <a:rPr lang="zh-CN" altLang="en-US" smtClean="0"/>
-              <a:t>2022/05/09</a:t>
+              <a:t>2022/05/15</a:t>
             </a:fld>
             <a:endParaRPr lang="zh-CN" altLang="en-US"/>
           </a:p>

</xml_diff>